<commit_message>
Adding cpp icon to documentation
</commit_message>
<xml_diff>
--- a/Documentation/Presentation-Conquers.pptx
+++ b/Documentation/Presentation-Conquers.pptx
@@ -19,19 +19,19 @@
   <p:notesSz cx="6858000" cy="9144000"/>
   <p:embeddedFontLst>
     <p:embeddedFont>
-      <p:font typeface="Montserrat" panose="00000500000000000000" pitchFamily="2" charset="-52"/>
+      <p:font typeface="Montserrat" panose="00000500000000000000" pitchFamily="2" charset="0"/>
       <p:regular r:id="rId9"/>
       <p:bold r:id="rId10"/>
       <p:italic r:id="rId11"/>
       <p:boldItalic r:id="rId12"/>
     </p:embeddedFont>
     <p:embeddedFont>
-      <p:font typeface="Montserrat ExtraBold" panose="00000900000000000000" pitchFamily="2" charset="-52"/>
+      <p:font typeface="Montserrat ExtraBold" panose="00000900000000000000" pitchFamily="2" charset="0"/>
       <p:bold r:id="rId13"/>
       <p:boldItalic r:id="rId14"/>
     </p:embeddedFont>
     <p:embeddedFont>
-      <p:font typeface="Montserrat ExtraLight" panose="00000300000000000000" pitchFamily="2" charset="-52"/>
+      <p:font typeface="Montserrat ExtraLight" panose="00000300000000000000" pitchFamily="2" charset="0"/>
       <p:regular r:id="rId15"/>
       <p:bold r:id="rId16"/>
       <p:italic r:id="rId17"/>
@@ -12597,7 +12597,7 @@
         </p:blipFill>
         <p:spPr>
           <a:xfrm>
-            <a:off x="2844804" y="1670753"/>
+            <a:off x="3386403" y="1824612"/>
             <a:ext cx="914400" cy="982212"/>
           </a:xfrm>
           <a:prstGeom prst="rect">
@@ -12633,7 +12633,7 @@
         </p:blipFill>
         <p:spPr>
           <a:xfrm>
-            <a:off x="1518200" y="1728872"/>
+            <a:off x="2059799" y="1882731"/>
             <a:ext cx="914400" cy="914400"/>
           </a:xfrm>
           <a:prstGeom prst="rect">
@@ -12669,7 +12669,7 @@
         </p:blipFill>
         <p:spPr>
           <a:xfrm>
-            <a:off x="3217598" y="2878510"/>
+            <a:off x="3455806" y="2986498"/>
             <a:ext cx="1041205" cy="1041205"/>
           </a:xfrm>
           <a:prstGeom prst="rect">
@@ -12705,7 +12705,7 @@
         </p:blipFill>
         <p:spPr>
           <a:xfrm>
-            <a:off x="1928673" y="2878510"/>
+            <a:off x="2059799" y="3047792"/>
             <a:ext cx="979911" cy="979911"/>
           </a:xfrm>
           <a:prstGeom prst="rect">
@@ -12741,7 +12741,7 @@
         </p:blipFill>
         <p:spPr>
           <a:xfrm>
-            <a:off x="4567817" y="2908581"/>
+            <a:off x="4806723" y="3051265"/>
             <a:ext cx="981062" cy="981062"/>
           </a:xfrm>
           <a:prstGeom prst="rect">
@@ -12777,7 +12777,7 @@
         </p:blipFill>
         <p:spPr>
           <a:xfrm>
-            <a:off x="5857893" y="2878510"/>
+            <a:off x="6097497" y="3047792"/>
             <a:ext cx="1047723" cy="1047723"/>
           </a:xfrm>
           <a:prstGeom prst="rect">
@@ -12813,7 +12813,7 @@
         </p:blipFill>
         <p:spPr>
           <a:xfrm>
-            <a:off x="4171408" y="1663361"/>
+            <a:off x="4713007" y="1817220"/>
             <a:ext cx="979911" cy="979911"/>
           </a:xfrm>
           <a:prstGeom prst="rect">
@@ -12849,7 +12849,7 @@
         </p:blipFill>
         <p:spPr>
           <a:xfrm>
-            <a:off x="5569817" y="1635993"/>
+            <a:off x="6111416" y="1789852"/>
             <a:ext cx="1051731" cy="1051731"/>
           </a:xfrm>
           <a:prstGeom prst="rect">
@@ -12879,8 +12879,38 @@
         </p:blipFill>
         <p:spPr>
           <a:xfrm>
-            <a:off x="7036899" y="1635993"/>
+            <a:off x="7388271" y="3159758"/>
             <a:ext cx="935757" cy="935757"/>
+          </a:xfrm>
+          <a:prstGeom prst="rect">
+            <a:avLst/>
+          </a:prstGeom>
+        </p:spPr>
+      </p:pic>
+      <p:pic>
+        <p:nvPicPr>
+          <p:cNvPr id="3" name="Picture 2" descr="A picture containing text, sign&#10;&#10;Description automatically generated">
+            <a:extLst>
+              <a:ext uri="{FF2B5EF4-FFF2-40B4-BE49-F238E27FC236}">
+                <a16:creationId xmlns:a16="http://schemas.microsoft.com/office/drawing/2014/main" id="{6EB6E049-AC43-63FA-0447-84DD177F3032}"/>
+              </a:ext>
+            </a:extLst>
+          </p:cNvPr>
+          <p:cNvPicPr>
+            <a:picLocks noChangeAspect="1"/>
+          </p:cNvPicPr>
+          <p:nvPr/>
+        </p:nvPicPr>
+        <p:blipFill>
+          <a:blip r:embed="rId12"/>
+          <a:stretch>
+            <a:fillRect/>
+          </a:stretch>
+        </p:blipFill>
+        <p:spPr>
+          <a:xfrm>
+            <a:off x="850443" y="1789852"/>
+            <a:ext cx="1000107" cy="1000107"/>
           </a:xfrm>
           <a:prstGeom prst="rect">
             <a:avLst/>

</xml_diff>